<commit_message>
Project 67 (최종 업로드)
끝
</commit_message>
<xml_diff>
--- a/2014180011 김영범 2DGP 프로젝트 2차 발표.pptx
+++ b/2014180011 김영범 2DGP 프로젝트 2차 발표.pptx
@@ -212,7 +212,7 @@
             <a:fld id="{65771C21-3757-4199-83DE-22960358A2A5}" type="datetimeFigureOut">
               <a:rPr lang="ko-KR" altLang="en-US" smtClean="0"/>
               <a:pPr/>
-              <a:t>2018-11-04</a:t>
+              <a:t>2018-12-02</a:t>
             </a:fld>
             <a:endParaRPr lang="ko-KR" altLang="en-US"/>
           </a:p>
@@ -1054,7 +1054,7 @@
             <a:fld id="{A22FE722-38C7-4231-8BB5-7A27D4E5977D}" type="datetimeFigureOut">
               <a:rPr lang="ko-KR" altLang="en-US" smtClean="0"/>
               <a:pPr/>
-              <a:t>2018-11-04</a:t>
+              <a:t>2018-12-02</a:t>
             </a:fld>
             <a:endParaRPr lang="ko-KR" altLang="en-US"/>
           </a:p>
@@ -1221,7 +1221,7 @@
             <a:fld id="{A22FE722-38C7-4231-8BB5-7A27D4E5977D}" type="datetimeFigureOut">
               <a:rPr lang="ko-KR" altLang="en-US" smtClean="0"/>
               <a:pPr/>
-              <a:t>2018-11-04</a:t>
+              <a:t>2018-12-02</a:t>
             </a:fld>
             <a:endParaRPr lang="ko-KR" altLang="en-US"/>
           </a:p>
@@ -1398,7 +1398,7 @@
             <a:fld id="{A22FE722-38C7-4231-8BB5-7A27D4E5977D}" type="datetimeFigureOut">
               <a:rPr lang="ko-KR" altLang="en-US" smtClean="0"/>
               <a:pPr/>
-              <a:t>2018-11-04</a:t>
+              <a:t>2018-12-02</a:t>
             </a:fld>
             <a:endParaRPr lang="ko-KR" altLang="en-US"/>
           </a:p>
@@ -1565,7 +1565,7 @@
             <a:fld id="{A22FE722-38C7-4231-8BB5-7A27D4E5977D}" type="datetimeFigureOut">
               <a:rPr lang="ko-KR" altLang="en-US" smtClean="0"/>
               <a:pPr/>
-              <a:t>2018-11-04</a:t>
+              <a:t>2018-12-02</a:t>
             </a:fld>
             <a:endParaRPr lang="ko-KR" altLang="en-US"/>
           </a:p>
@@ -1808,7 +1808,7 @@
             <a:fld id="{A22FE722-38C7-4231-8BB5-7A27D4E5977D}" type="datetimeFigureOut">
               <a:rPr lang="ko-KR" altLang="en-US" smtClean="0"/>
               <a:pPr/>
-              <a:t>2018-11-04</a:t>
+              <a:t>2018-12-02</a:t>
             </a:fld>
             <a:endParaRPr lang="ko-KR" altLang="en-US"/>
           </a:p>
@@ -2093,7 +2093,7 @@
             <a:fld id="{A22FE722-38C7-4231-8BB5-7A27D4E5977D}" type="datetimeFigureOut">
               <a:rPr lang="ko-KR" altLang="en-US" smtClean="0"/>
               <a:pPr/>
-              <a:t>2018-11-04</a:t>
+              <a:t>2018-12-02</a:t>
             </a:fld>
             <a:endParaRPr lang="ko-KR" altLang="en-US"/>
           </a:p>
@@ -2512,7 +2512,7 @@
             <a:fld id="{A22FE722-38C7-4231-8BB5-7A27D4E5977D}" type="datetimeFigureOut">
               <a:rPr lang="ko-KR" altLang="en-US" smtClean="0"/>
               <a:pPr/>
-              <a:t>2018-11-04</a:t>
+              <a:t>2018-12-02</a:t>
             </a:fld>
             <a:endParaRPr lang="ko-KR" altLang="en-US"/>
           </a:p>
@@ -2627,7 +2627,7 @@
             <a:fld id="{A22FE722-38C7-4231-8BB5-7A27D4E5977D}" type="datetimeFigureOut">
               <a:rPr lang="ko-KR" altLang="en-US" smtClean="0"/>
               <a:pPr/>
-              <a:t>2018-11-04</a:t>
+              <a:t>2018-12-02</a:t>
             </a:fld>
             <a:endParaRPr lang="ko-KR" altLang="en-US"/>
           </a:p>
@@ -2719,7 +2719,7 @@
             <a:fld id="{A22FE722-38C7-4231-8BB5-7A27D4E5977D}" type="datetimeFigureOut">
               <a:rPr lang="ko-KR" altLang="en-US" smtClean="0"/>
               <a:pPr/>
-              <a:t>2018-11-04</a:t>
+              <a:t>2018-12-02</a:t>
             </a:fld>
             <a:endParaRPr lang="ko-KR" altLang="en-US"/>
           </a:p>
@@ -2993,7 +2993,7 @@
             <a:fld id="{A22FE722-38C7-4231-8BB5-7A27D4E5977D}" type="datetimeFigureOut">
               <a:rPr lang="ko-KR" altLang="en-US" smtClean="0"/>
               <a:pPr/>
-              <a:t>2018-11-04</a:t>
+              <a:t>2018-12-02</a:t>
             </a:fld>
             <a:endParaRPr lang="ko-KR" altLang="en-US"/>
           </a:p>
@@ -3243,7 +3243,7 @@
             <a:fld id="{A22FE722-38C7-4231-8BB5-7A27D4E5977D}" type="datetimeFigureOut">
               <a:rPr lang="ko-KR" altLang="en-US" smtClean="0"/>
               <a:pPr/>
-              <a:t>2018-11-04</a:t>
+              <a:t>2018-12-02</a:t>
             </a:fld>
             <a:endParaRPr lang="ko-KR" altLang="en-US"/>
           </a:p>
@@ -3453,7 +3453,7 @@
             <a:fld id="{A22FE722-38C7-4231-8BB5-7A27D4E5977D}" type="datetimeFigureOut">
               <a:rPr lang="ko-KR" altLang="en-US" smtClean="0"/>
               <a:pPr/>
-              <a:t>2018-11-04</a:t>
+              <a:t>2018-12-02</a:t>
             </a:fld>
             <a:endParaRPr lang="ko-KR" altLang="en-US"/>
           </a:p>
@@ -4405,7 +4405,7 @@
           <a:lstStyle/>
           <a:p>
             <a:r>
-              <a:rPr lang="ko-KR" altLang="en-US" sz="2800" b="1" spc="-150" dirty="0" smtClean="0">
+              <a:rPr lang="ko-KR" altLang="en-US" sz="2800" b="1" spc="-150" smtClean="0">
                 <a:solidFill>
                   <a:schemeClr val="tx2">
                     <a:lumMod val="75000"/>
@@ -4413,7 +4413,18 @@
                 </a:solidFill>
                 <a:latin typeface="+mj-ea"/>
               </a:rPr>
-              <a:t>게임 컨셉</a:t>
+              <a:t>게임 </a:t>
+            </a:r>
+            <a:r>
+              <a:rPr lang="ko-KR" altLang="en-US" sz="2800" b="1" spc="-150" smtClean="0">
+                <a:solidFill>
+                  <a:schemeClr val="tx2">
+                    <a:lumMod val="75000"/>
+                  </a:schemeClr>
+                </a:solidFill>
+                <a:latin typeface="+mj-ea"/>
+              </a:rPr>
+              <a:t>컨셉</a:t>
             </a:r>
             <a:endParaRPr lang="ko-KR" altLang="en-US" sz="2800" dirty="0">
               <a:solidFill>
@@ -4505,13 +4516,6 @@
               </a:rPr>
               <a:t>’ !</a:t>
             </a:r>
-            <a:endParaRPr lang="en-US" altLang="ko-KR" sz="2000" b="1" spc="-150" dirty="0" smtClean="0">
-              <a:solidFill>
-                <a:schemeClr val="accent5">
-                  <a:lumMod val="50000"/>
-                </a:schemeClr>
-              </a:solidFill>
-            </a:endParaRPr>
           </a:p>
         </p:txBody>
       </p:sp>
@@ -6332,11 +6336,7 @@
                       </a:r>
                       <a:r>
                         <a:rPr lang="ko-KR" altLang="en-US" sz="1200" dirty="0" smtClean="0"/>
-                        <a:t>메인 </a:t>
-                      </a:r>
-                      <a:r>
-                        <a:rPr lang="ko-KR" altLang="en-US" sz="1200" dirty="0" smtClean="0"/>
-                        <a:t>화면 구현</a:t>
+                        <a:t>메인 화면 구현</a:t>
                       </a:r>
                       <a:endParaRPr lang="en-US" altLang="ko-KR" sz="1200" dirty="0" smtClean="0"/>
                     </a:p>
@@ -6350,11 +6350,7 @@
                       </a:r>
                       <a:r>
                         <a:rPr lang="ko-KR" altLang="en-US" sz="1200" dirty="0" smtClean="0"/>
-                        <a:t>게임 </a:t>
-                      </a:r>
-                      <a:r>
-                        <a:rPr lang="ko-KR" altLang="en-US" sz="1200" dirty="0" smtClean="0"/>
-                        <a:t>시작 시 난이도 선택</a:t>
+                        <a:t>게임 시작 시 난이도 선택</a:t>
                       </a:r>
                       <a:endParaRPr lang="en-US" altLang="ko-KR" sz="1200" dirty="0" smtClean="0"/>
                     </a:p>
@@ -6368,11 +6364,7 @@
                       </a:r>
                       <a:r>
                         <a:rPr lang="ko-KR" altLang="en-US" sz="1200" dirty="0" smtClean="0"/>
-                        <a:t>인 </a:t>
-                      </a:r>
-                      <a:r>
-                        <a:rPr lang="ko-KR" altLang="en-US" sz="1200" dirty="0" smtClean="0"/>
-                        <a:t>게임 화면 및 오브젝트 배치</a:t>
+                        <a:t>인 게임 화면 및 오브젝트 배치</a:t>
                       </a:r>
                       <a:endParaRPr lang="en-US" altLang="ko-KR" sz="1200" dirty="0" smtClean="0"/>
                     </a:p>
@@ -7062,15 +7054,7 @@
                       </a:r>
                       <a:r>
                         <a:rPr lang="ko-KR" altLang="en-US" sz="1200" dirty="0" smtClean="0"/>
-                        <a:t>주차 </a:t>
-                      </a:r>
-                      <a:r>
-                        <a:rPr lang="ko-KR" altLang="en-US" sz="1200" dirty="0" smtClean="0"/>
-                        <a:t>애로 </a:t>
-                      </a:r>
-                      <a:r>
-                        <a:rPr lang="ko-KR" altLang="en-US" sz="1200" dirty="0" smtClean="0"/>
-                        <a:t>사항 수정 및 보완</a:t>
+                        <a:t>주차 애로 사항 수정 및 보완</a:t>
                       </a:r>
                       <a:endParaRPr lang="ko-KR" altLang="en-US" sz="1200" dirty="0"/>
                     </a:p>

</xml_diff>